<commit_message>
Flow chart version 1 -Feel free to make changes
</commit_message>
<xml_diff>
--- a/flowchart.pptx
+++ b/flowchart.pptx
@@ -243,7 +243,7 @@
           <a:p>
             <a:fld id="{475E5E75-46B5-40D3-A925-650BA57538AE}" type="datetimeFigureOut">
               <a:rPr lang="en-US" smtClean="0"/>
-              <a:t>10/16/2015</a:t>
+              <a:t>10/18/2015</a:t>
             </a:fld>
             <a:endParaRPr lang="en-US"/>
           </a:p>
@@ -413,7 +413,7 @@
           <a:p>
             <a:fld id="{475E5E75-46B5-40D3-A925-650BA57538AE}" type="datetimeFigureOut">
               <a:rPr lang="en-US" smtClean="0"/>
-              <a:t>10/16/2015</a:t>
+              <a:t>10/18/2015</a:t>
             </a:fld>
             <a:endParaRPr lang="en-US"/>
           </a:p>
@@ -593,7 +593,7 @@
           <a:p>
             <a:fld id="{475E5E75-46B5-40D3-A925-650BA57538AE}" type="datetimeFigureOut">
               <a:rPr lang="en-US" smtClean="0"/>
-              <a:t>10/16/2015</a:t>
+              <a:t>10/18/2015</a:t>
             </a:fld>
             <a:endParaRPr lang="en-US"/>
           </a:p>
@@ -763,7 +763,7 @@
           <a:p>
             <a:fld id="{475E5E75-46B5-40D3-A925-650BA57538AE}" type="datetimeFigureOut">
               <a:rPr lang="en-US" smtClean="0"/>
-              <a:t>10/16/2015</a:t>
+              <a:t>10/18/2015</a:t>
             </a:fld>
             <a:endParaRPr lang="en-US"/>
           </a:p>
@@ -1009,7 +1009,7 @@
           <a:p>
             <a:fld id="{475E5E75-46B5-40D3-A925-650BA57538AE}" type="datetimeFigureOut">
               <a:rPr lang="en-US" smtClean="0"/>
-              <a:t>10/16/2015</a:t>
+              <a:t>10/18/2015</a:t>
             </a:fld>
             <a:endParaRPr lang="en-US"/>
           </a:p>
@@ -1241,7 +1241,7 @@
           <a:p>
             <a:fld id="{475E5E75-46B5-40D3-A925-650BA57538AE}" type="datetimeFigureOut">
               <a:rPr lang="en-US" smtClean="0"/>
-              <a:t>10/16/2015</a:t>
+              <a:t>10/18/2015</a:t>
             </a:fld>
             <a:endParaRPr lang="en-US"/>
           </a:p>
@@ -1608,7 +1608,7 @@
           <a:p>
             <a:fld id="{475E5E75-46B5-40D3-A925-650BA57538AE}" type="datetimeFigureOut">
               <a:rPr lang="en-US" smtClean="0"/>
-              <a:t>10/16/2015</a:t>
+              <a:t>10/18/2015</a:t>
             </a:fld>
             <a:endParaRPr lang="en-US"/>
           </a:p>
@@ -1726,7 +1726,7 @@
           <a:p>
             <a:fld id="{475E5E75-46B5-40D3-A925-650BA57538AE}" type="datetimeFigureOut">
               <a:rPr lang="en-US" smtClean="0"/>
-              <a:t>10/16/2015</a:t>
+              <a:t>10/18/2015</a:t>
             </a:fld>
             <a:endParaRPr lang="en-US"/>
           </a:p>
@@ -1821,7 +1821,7 @@
           <a:p>
             <a:fld id="{475E5E75-46B5-40D3-A925-650BA57538AE}" type="datetimeFigureOut">
               <a:rPr lang="en-US" smtClean="0"/>
-              <a:t>10/16/2015</a:t>
+              <a:t>10/18/2015</a:t>
             </a:fld>
             <a:endParaRPr lang="en-US"/>
           </a:p>
@@ -2098,7 +2098,7 @@
           <a:p>
             <a:fld id="{475E5E75-46B5-40D3-A925-650BA57538AE}" type="datetimeFigureOut">
               <a:rPr lang="en-US" smtClean="0"/>
-              <a:t>10/16/2015</a:t>
+              <a:t>10/18/2015</a:t>
             </a:fld>
             <a:endParaRPr lang="en-US"/>
           </a:p>
@@ -2351,7 +2351,7 @@
           <a:p>
             <a:fld id="{475E5E75-46B5-40D3-A925-650BA57538AE}" type="datetimeFigureOut">
               <a:rPr lang="en-US" smtClean="0"/>
-              <a:t>10/16/2015</a:t>
+              <a:t>10/18/2015</a:t>
             </a:fld>
             <a:endParaRPr lang="en-US"/>
           </a:p>
@@ -2564,7 +2564,7 @@
           <a:p>
             <a:fld id="{475E5E75-46B5-40D3-A925-650BA57538AE}" type="datetimeFigureOut">
               <a:rPr lang="en-US" smtClean="0"/>
-              <a:t>10/16/2015</a:t>
+              <a:t>10/18/2015</a:t>
             </a:fld>
             <a:endParaRPr lang="en-US"/>
           </a:p>
@@ -3007,8 +3007,8 @@
         </p:nvSpPr>
         <p:spPr>
           <a:xfrm>
-            <a:off x="1571625" y="0"/>
-            <a:ext cx="10620375" cy="1943100"/>
+            <a:off x="608911" y="2"/>
+            <a:ext cx="11480693" cy="1943100"/>
           </a:xfrm>
           <a:prstGeom prst="roundRect">
             <a:avLst/>
@@ -3040,7 +3040,7 @@
           <a:bodyPr rtlCol="0" anchor="ctr"/>
           <a:lstStyle/>
           <a:p>
-            <a:pPr marL="285750" indent="-285750">
+            <a:pPr marL="285750" indent="-285750" algn="ctr">
               <a:buFont typeface="Arial" panose="020B0604020202020204" pitchFamily="34" charset="0"/>
               <a:buChar char="•"/>
             </a:pPr>
@@ -3060,8 +3060,8 @@
         </p:nvSpPr>
         <p:spPr>
           <a:xfrm>
-            <a:off x="1571625" y="1943100"/>
-            <a:ext cx="10620374" cy="2486026"/>
+            <a:off x="637487" y="1943102"/>
+            <a:ext cx="11480693" cy="2486026"/>
           </a:xfrm>
           <a:prstGeom prst="roundRect">
             <a:avLst/>
@@ -3106,8 +3106,8 @@
         </p:nvSpPr>
         <p:spPr>
           <a:xfrm>
-            <a:off x="1571624" y="4429126"/>
-            <a:ext cx="10620374" cy="2400300"/>
+            <a:off x="637489" y="4377425"/>
+            <a:ext cx="11480693" cy="2400300"/>
           </a:xfrm>
           <a:prstGeom prst="roundRect">
             <a:avLst/>
@@ -3152,7 +3152,7 @@
         </p:nvSpPr>
         <p:spPr>
           <a:xfrm>
-            <a:off x="1771654" y="135732"/>
+            <a:off x="2386016" y="135732"/>
             <a:ext cx="2814638" cy="1585912"/>
           </a:xfrm>
           <a:prstGeom prst="rect">
@@ -3190,8 +3190,21 @@
                   <a:schemeClr val="tx1"/>
                 </a:solidFill>
               </a:rPr>
-              <a:t>Selection of Data</a:t>
-            </a:r>
+              <a:t>Selection of </a:t>
+            </a:r>
+            <a:r>
+              <a:rPr lang="en-US" dirty="0" smtClean="0">
+                <a:solidFill>
+                  <a:schemeClr val="tx1"/>
+                </a:solidFill>
+              </a:rPr>
+              <a:t>Data</a:t>
+            </a:r>
+            <a:endParaRPr lang="en-US" dirty="0">
+              <a:solidFill>
+                <a:schemeClr val="tx1"/>
+              </a:solidFill>
+            </a:endParaRPr>
           </a:p>
           <a:p>
             <a:pPr marL="285750" indent="-285750">
@@ -3213,13 +3226,18 @@
               <a:buChar char="•"/>
             </a:pPr>
             <a:r>
-              <a:rPr lang="en-US" dirty="0">
+              <a:rPr lang="en-US" dirty="0" smtClean="0">
                 <a:solidFill>
                   <a:schemeClr val="tx1"/>
                 </a:solidFill>
               </a:rPr>
-              <a:t>Decision of best Features</a:t>
-            </a:r>
+              <a:t>Calculation of features based on data</a:t>
+            </a:r>
+            <a:endParaRPr lang="en-US" dirty="0">
+              <a:solidFill>
+                <a:schemeClr val="tx1"/>
+              </a:solidFill>
+            </a:endParaRPr>
           </a:p>
           <a:p>
             <a:pPr marL="285750" indent="-285750">
@@ -3237,49 +3255,109 @@
           </a:p>
         </p:txBody>
       </p:sp>
-      <p:cxnSp>
-        <p:nvCxnSpPr>
-          <p:cNvPr id="8" name="Straight Arrow Connector 7"/>
-          <p:cNvCxnSpPr/>
+      <p:sp>
+        <p:nvSpPr>
+          <p:cNvPr id="7" name="TextBox 6"/>
+          <p:cNvSpPr txBox="1"/>
           <p:nvPr/>
-        </p:nvCxnSpPr>
-        <p:spPr>
-          <a:xfrm>
-            <a:off x="4586291" y="971550"/>
-            <a:ext cx="1200150" cy="0"/>
-          </a:xfrm>
-          <a:prstGeom prst="straightConnector1">
+        </p:nvSpPr>
+        <p:spPr>
+          <a:xfrm rot="16200000">
+            <a:off x="-328611" y="428625"/>
+            <a:ext cx="1285875" cy="646331"/>
+          </a:xfrm>
+          <a:prstGeom prst="rect">
             <a:avLst/>
           </a:prstGeom>
-          <a:ln>
-            <a:tailEnd type="triangle"/>
-          </a:ln>
-        </p:spPr>
-        <p:style>
-          <a:lnRef idx="1">
-            <a:schemeClr val="accent1"/>
-          </a:lnRef>
-          <a:fillRef idx="0">
-            <a:schemeClr val="accent1"/>
-          </a:fillRef>
-          <a:effectRef idx="0">
-            <a:schemeClr val="accent1"/>
-          </a:effectRef>
-          <a:fontRef idx="minor">
-            <a:schemeClr val="tx1"/>
-          </a:fontRef>
-        </p:style>
-      </p:cxnSp>
-      <p:sp>
-        <p:nvSpPr>
-          <p:cNvPr id="9" name="Rectangle 8"/>
+          <a:noFill/>
+        </p:spPr>
+        <p:txBody>
+          <a:bodyPr wrap="square" rtlCol="0">
+            <a:spAutoFit/>
+          </a:bodyPr>
+          <a:lstStyle/>
+          <a:p>
+            <a:pPr algn="ctr"/>
+            <a:r>
+              <a:rPr lang="en-US" dirty="0" smtClean="0"/>
+              <a:t>Data Related</a:t>
+            </a:r>
+            <a:endParaRPr lang="en-US" dirty="0"/>
+          </a:p>
+        </p:txBody>
+      </p:sp>
+      <p:sp>
+        <p:nvSpPr>
+          <p:cNvPr id="10" name="TextBox 9"/>
+          <p:cNvSpPr txBox="1"/>
+          <p:nvPr/>
+        </p:nvSpPr>
+        <p:spPr>
+          <a:xfrm rot="16200000">
+            <a:off x="-328616" y="2862947"/>
+            <a:ext cx="1285875" cy="646331"/>
+          </a:xfrm>
+          <a:prstGeom prst="rect">
+            <a:avLst/>
+          </a:prstGeom>
+          <a:noFill/>
+        </p:spPr>
+        <p:txBody>
+          <a:bodyPr wrap="square" rtlCol="0">
+            <a:spAutoFit/>
+          </a:bodyPr>
+          <a:lstStyle/>
+          <a:p>
+            <a:pPr algn="ctr"/>
+            <a:r>
+              <a:rPr lang="en-US" dirty="0" smtClean="0"/>
+              <a:t>Algorithm Based</a:t>
+            </a:r>
+            <a:endParaRPr lang="en-US" dirty="0"/>
+          </a:p>
+        </p:txBody>
+      </p:sp>
+      <p:sp>
+        <p:nvSpPr>
+          <p:cNvPr id="11" name="TextBox 10"/>
+          <p:cNvSpPr txBox="1"/>
+          <p:nvPr/>
+        </p:nvSpPr>
+        <p:spPr>
+          <a:xfrm rot="16200000">
+            <a:off x="-442915" y="5320010"/>
+            <a:ext cx="1285875" cy="646331"/>
+          </a:xfrm>
+          <a:prstGeom prst="rect">
+            <a:avLst/>
+          </a:prstGeom>
+          <a:noFill/>
+        </p:spPr>
+        <p:txBody>
+          <a:bodyPr wrap="square" rtlCol="0">
+            <a:spAutoFit/>
+          </a:bodyPr>
+          <a:lstStyle/>
+          <a:p>
+            <a:pPr algn="ctr"/>
+            <a:r>
+              <a:rPr lang="en-US" dirty="0" smtClean="0"/>
+              <a:t>Output Related</a:t>
+            </a:r>
+            <a:endParaRPr lang="en-US" dirty="0"/>
+          </a:p>
+        </p:txBody>
+      </p:sp>
+      <p:sp>
+        <p:nvSpPr>
+          <p:cNvPr id="13" name="Rectangle 12"/>
           <p:cNvSpPr/>
           <p:nvPr/>
         </p:nvSpPr>
         <p:spPr>
           <a:xfrm>
-            <a:off x="5786441" y="135732"/>
-            <a:ext cx="3057525" cy="1585912"/>
+            <a:off x="6343648" y="135732"/>
+            <a:ext cx="4329109" cy="1585912"/>
           </a:xfrm>
           <a:prstGeom prst="rect">
             <a:avLst/>
@@ -3306,10 +3384,403 @@
           <a:bodyPr rtlCol="0" anchor="ctr"/>
           <a:lstStyle/>
           <a:p>
-            <a:pPr marL="285750" indent="-285750" algn="ctr">
+            <a:pPr marL="285750" indent="-285750">
               <a:buFont typeface="Arial" panose="020B0604020202020204" pitchFamily="34" charset="0"/>
               <a:buChar char="•"/>
             </a:pPr>
+            <a:r>
+              <a:rPr lang="en-US" dirty="0" smtClean="0">
+                <a:solidFill>
+                  <a:schemeClr val="tx1"/>
+                </a:solidFill>
+              </a:rPr>
+              <a:t>Mode 1:Apply All Features to Algorithm </a:t>
+            </a:r>
+          </a:p>
+          <a:p>
+            <a:pPr marL="285750" indent="-285750">
+              <a:buFont typeface="Arial" panose="020B0604020202020204" pitchFamily="34" charset="0"/>
+              <a:buChar char="•"/>
+            </a:pPr>
+            <a:r>
+              <a:rPr lang="en-US" dirty="0" smtClean="0">
+                <a:solidFill>
+                  <a:schemeClr val="tx1"/>
+                </a:solidFill>
+              </a:rPr>
+              <a:t>Mode 2: Apply few features</a:t>
+            </a:r>
+            <a:br>
+              <a:rPr lang="en-US" dirty="0" smtClean="0">
+                <a:solidFill>
+                  <a:schemeClr val="tx1"/>
+                </a:solidFill>
+              </a:rPr>
+            </a:br>
+            <a:r>
+              <a:rPr lang="en-US" dirty="0" smtClean="0">
+                <a:solidFill>
+                  <a:schemeClr val="tx1"/>
+                </a:solidFill>
+              </a:rPr>
+              <a:t>Mode 2A: Random.</a:t>
+            </a:r>
+            <a:r>
+              <a:rPr lang="en-US" dirty="0">
+                <a:solidFill>
+                  <a:schemeClr val="tx1"/>
+                </a:solidFill>
+              </a:rPr>
+              <a:t/>
+            </a:r>
+            <a:br>
+              <a:rPr lang="en-US" dirty="0">
+                <a:solidFill>
+                  <a:schemeClr val="tx1"/>
+                </a:solidFill>
+              </a:rPr>
+            </a:br>
+            <a:r>
+              <a:rPr lang="en-US" dirty="0" smtClean="0">
+                <a:solidFill>
+                  <a:schemeClr val="tx1"/>
+                </a:solidFill>
+              </a:rPr>
+              <a:t>Mode 2B: selected.</a:t>
+            </a:r>
+          </a:p>
+        </p:txBody>
+      </p:sp>
+      <p:sp>
+        <p:nvSpPr>
+          <p:cNvPr id="15" name="Right Arrow 14"/>
+          <p:cNvSpPr/>
+          <p:nvPr/>
+        </p:nvSpPr>
+        <p:spPr>
+          <a:xfrm>
+            <a:off x="5343530" y="750094"/>
+            <a:ext cx="871527" cy="292894"/>
+          </a:xfrm>
+          <a:prstGeom prst="rightArrow">
+            <a:avLst/>
+          </a:prstGeom>
+        </p:spPr>
+        <p:style>
+          <a:lnRef idx="2">
+            <a:schemeClr val="accent1">
+              <a:shade val="50000"/>
+            </a:schemeClr>
+          </a:lnRef>
+          <a:fillRef idx="1">
+            <a:schemeClr val="accent1"/>
+          </a:fillRef>
+          <a:effectRef idx="0">
+            <a:schemeClr val="accent1"/>
+          </a:effectRef>
+          <a:fontRef idx="minor">
+            <a:schemeClr val="lt1"/>
+          </a:fontRef>
+        </p:style>
+        <p:txBody>
+          <a:bodyPr rtlCol="0" anchor="ctr"/>
+          <a:lstStyle/>
+          <a:p>
+            <a:pPr algn="ctr"/>
+            <a:endParaRPr lang="en-US"/>
+          </a:p>
+        </p:txBody>
+      </p:sp>
+      <p:sp>
+        <p:nvSpPr>
+          <p:cNvPr id="16" name="Rounded Rectangle 15"/>
+          <p:cNvSpPr/>
+          <p:nvPr/>
+        </p:nvSpPr>
+        <p:spPr>
+          <a:xfrm>
+            <a:off x="627575" y="-26880"/>
+            <a:ext cx="1385888" cy="6884880"/>
+          </a:xfrm>
+          <a:prstGeom prst="roundRect">
+            <a:avLst/>
+          </a:prstGeom>
+          <a:solidFill>
+            <a:schemeClr val="accent2">
+              <a:lumMod val="20000"/>
+              <a:lumOff val="80000"/>
+            </a:schemeClr>
+          </a:solidFill>
+        </p:spPr>
+        <p:style>
+          <a:lnRef idx="2">
+            <a:schemeClr val="accent1">
+              <a:shade val="50000"/>
+            </a:schemeClr>
+          </a:lnRef>
+          <a:fillRef idx="1">
+            <a:schemeClr val="accent1"/>
+          </a:fillRef>
+          <a:effectRef idx="0">
+            <a:schemeClr val="accent1"/>
+          </a:effectRef>
+          <a:fontRef idx="minor">
+            <a:schemeClr val="lt1"/>
+          </a:fontRef>
+        </p:style>
+        <p:txBody>
+          <a:bodyPr rtlCol="0" anchor="ctr"/>
+          <a:lstStyle/>
+          <a:p>
+            <a:pPr algn="ctr"/>
+            <a:endParaRPr lang="en-US"/>
+          </a:p>
+        </p:txBody>
+      </p:sp>
+      <p:sp>
+        <p:nvSpPr>
+          <p:cNvPr id="17" name="Rounded Rectangle 16"/>
+          <p:cNvSpPr/>
+          <p:nvPr/>
+        </p:nvSpPr>
+        <p:spPr>
+          <a:xfrm>
+            <a:off x="10732292" y="2"/>
+            <a:ext cx="1385888" cy="6857998"/>
+          </a:xfrm>
+          <a:prstGeom prst="roundRect">
+            <a:avLst/>
+          </a:prstGeom>
+          <a:solidFill>
+            <a:schemeClr val="accent6">
+              <a:lumMod val="20000"/>
+              <a:lumOff val="80000"/>
+            </a:schemeClr>
+          </a:solidFill>
+        </p:spPr>
+        <p:style>
+          <a:lnRef idx="2">
+            <a:schemeClr val="accent1">
+              <a:shade val="50000"/>
+            </a:schemeClr>
+          </a:lnRef>
+          <a:fillRef idx="1">
+            <a:schemeClr val="accent1"/>
+          </a:fillRef>
+          <a:effectRef idx="0">
+            <a:schemeClr val="accent1"/>
+          </a:effectRef>
+          <a:fontRef idx="minor">
+            <a:schemeClr val="lt1"/>
+          </a:fontRef>
+        </p:style>
+        <p:txBody>
+          <a:bodyPr rtlCol="0" anchor="ctr"/>
+          <a:lstStyle/>
+          <a:p>
+            <a:pPr algn="ctr"/>
+            <a:endParaRPr lang="en-US"/>
+          </a:p>
+        </p:txBody>
+      </p:sp>
+      <p:sp>
+        <p:nvSpPr>
+          <p:cNvPr id="18" name="TextBox 17"/>
+          <p:cNvSpPr txBox="1"/>
+          <p:nvPr/>
+        </p:nvSpPr>
+        <p:spPr>
+          <a:xfrm>
+            <a:off x="741855" y="426928"/>
+            <a:ext cx="1171589" cy="646331"/>
+          </a:xfrm>
+          <a:prstGeom prst="rect">
+            <a:avLst/>
+          </a:prstGeom>
+          <a:noFill/>
+        </p:spPr>
+        <p:txBody>
+          <a:bodyPr wrap="square" rtlCol="0">
+            <a:spAutoFit/>
+          </a:bodyPr>
+          <a:lstStyle/>
+          <a:p>
+            <a:r>
+              <a:rPr lang="en-US" dirty="0" smtClean="0"/>
+              <a:t>Mode Selection</a:t>
+            </a:r>
+            <a:endParaRPr lang="en-US" dirty="0"/>
+          </a:p>
+        </p:txBody>
+      </p:sp>
+      <p:sp>
+        <p:nvSpPr>
+          <p:cNvPr id="19" name="TextBox 18"/>
+          <p:cNvSpPr txBox="1"/>
+          <p:nvPr/>
+        </p:nvSpPr>
+        <p:spPr>
+          <a:xfrm>
+            <a:off x="10833989" y="478184"/>
+            <a:ext cx="1311062" cy="1754326"/>
+          </a:xfrm>
+          <a:prstGeom prst="rect">
+            <a:avLst/>
+          </a:prstGeom>
+          <a:noFill/>
+        </p:spPr>
+        <p:txBody>
+          <a:bodyPr wrap="square" rtlCol="0">
+            <a:spAutoFit/>
+          </a:bodyPr>
+          <a:lstStyle/>
+          <a:p>
+            <a:r>
+              <a:rPr lang="en-US" dirty="0" smtClean="0"/>
+              <a:t>Selected Mode(I/P nodes)</a:t>
+            </a:r>
+          </a:p>
+          <a:p>
+            <a:endParaRPr lang="en-US" dirty="0" smtClean="0"/>
+          </a:p>
+          <a:p>
+            <a:r>
+              <a:rPr lang="en-US" dirty="0" smtClean="0"/>
+              <a:t>Related Features</a:t>
+            </a:r>
+          </a:p>
+        </p:txBody>
+      </p:sp>
+      <p:sp>
+        <p:nvSpPr>
+          <p:cNvPr id="22" name="TextBox 21"/>
+          <p:cNvSpPr txBox="1"/>
+          <p:nvPr/>
+        </p:nvSpPr>
+        <p:spPr>
+          <a:xfrm>
+            <a:off x="672118" y="2001945"/>
+            <a:ext cx="1311062" cy="2031325"/>
+          </a:xfrm>
+          <a:prstGeom prst="rect">
+            <a:avLst/>
+          </a:prstGeom>
+          <a:noFill/>
+        </p:spPr>
+        <p:txBody>
+          <a:bodyPr wrap="square" rtlCol="0">
+            <a:spAutoFit/>
+          </a:bodyPr>
+          <a:lstStyle/>
+          <a:p>
+            <a:r>
+              <a:rPr lang="en-US" dirty="0" smtClean="0"/>
+              <a:t>Select ANN Layers and nodes</a:t>
+            </a:r>
+          </a:p>
+          <a:p>
+            <a:endParaRPr lang="en-US" dirty="0"/>
+          </a:p>
+          <a:p>
+            <a:r>
+              <a:rPr lang="en-US" dirty="0" smtClean="0"/>
+              <a:t>Set algorithm Parameter</a:t>
+            </a:r>
+          </a:p>
+        </p:txBody>
+      </p:sp>
+      <p:sp>
+        <p:nvSpPr>
+          <p:cNvPr id="23" name="Rectangle 22"/>
+          <p:cNvSpPr/>
+          <p:nvPr/>
+        </p:nvSpPr>
+        <p:spPr>
+          <a:xfrm>
+            <a:off x="2027746" y="2051686"/>
+            <a:ext cx="2814638" cy="2234564"/>
+          </a:xfrm>
+          <a:prstGeom prst="rect">
+            <a:avLst/>
+          </a:prstGeom>
+          <a:noFill/>
+        </p:spPr>
+        <p:style>
+          <a:lnRef idx="2">
+            <a:schemeClr val="accent1">
+              <a:shade val="50000"/>
+            </a:schemeClr>
+          </a:lnRef>
+          <a:fillRef idx="1">
+            <a:schemeClr val="accent1"/>
+          </a:fillRef>
+          <a:effectRef idx="0">
+            <a:schemeClr val="accent1"/>
+          </a:effectRef>
+          <a:fontRef idx="minor">
+            <a:schemeClr val="lt1"/>
+          </a:fontRef>
+        </p:style>
+        <p:txBody>
+          <a:bodyPr rtlCol="0" anchor="ctr"/>
+          <a:lstStyle/>
+          <a:p>
+            <a:pPr marL="285750" indent="-285750">
+              <a:buFont typeface="Arial" panose="020B0604020202020204" pitchFamily="34" charset="0"/>
+              <a:buChar char="•"/>
+            </a:pPr>
+            <a:r>
+              <a:rPr lang="en-US" dirty="0" smtClean="0">
+                <a:solidFill>
+                  <a:schemeClr val="tx1"/>
+                </a:solidFill>
+              </a:rPr>
+              <a:t>Selection of </a:t>
+            </a:r>
+            <a:r>
+              <a:rPr lang="en-US" dirty="0" err="1" smtClean="0">
+                <a:solidFill>
+                  <a:schemeClr val="tx1"/>
+                </a:solidFill>
+              </a:rPr>
+              <a:t>Noof</a:t>
+            </a:r>
+            <a:r>
+              <a:rPr lang="en-US" dirty="0" smtClean="0">
+                <a:solidFill>
+                  <a:schemeClr val="tx1"/>
+                </a:solidFill>
+              </a:rPr>
+              <a:t> Hidden Layers &amp; Nodes per each layer</a:t>
+            </a:r>
+          </a:p>
+          <a:p>
+            <a:pPr marL="285750" indent="-285750">
+              <a:buFont typeface="Arial" panose="020B0604020202020204" pitchFamily="34" charset="0"/>
+              <a:buChar char="•"/>
+            </a:pPr>
+            <a:r>
+              <a:rPr lang="en-US" dirty="0" smtClean="0">
+                <a:solidFill>
+                  <a:srgbClr val="FF0000"/>
+                </a:solidFill>
+              </a:rPr>
+              <a:t>Selection of output nodes </a:t>
+            </a:r>
+          </a:p>
+          <a:p>
+            <a:pPr marL="285750" indent="-285750">
+              <a:buFont typeface="Arial" panose="020B0604020202020204" pitchFamily="34" charset="0"/>
+              <a:buChar char="•"/>
+            </a:pPr>
+            <a:r>
+              <a:rPr lang="en-US" dirty="0" smtClean="0">
+                <a:solidFill>
+                  <a:schemeClr val="tx1"/>
+                </a:solidFill>
+              </a:rPr>
+              <a:t> Setting algorithm parameters like(Momentum ,etc.,)</a:t>
+            </a:r>
             <a:endParaRPr lang="en-US" dirty="0">
               <a:solidFill>
                 <a:schemeClr val="tx1"/>
@@ -3320,76 +3791,224 @@
       </p:sp>
       <p:sp>
         <p:nvSpPr>
-          <p:cNvPr id="7" name="TextBox 6"/>
-          <p:cNvSpPr txBox="1"/>
+          <p:cNvPr id="25" name="Right Arrow 24"/>
+          <p:cNvSpPr/>
           <p:nvPr/>
         </p:nvSpPr>
         <p:spPr>
           <a:xfrm>
-            <a:off x="142875" y="428625"/>
-            <a:ext cx="1285875" cy="646331"/>
+            <a:off x="4845845" y="2971800"/>
+            <a:ext cx="578639" cy="332453"/>
+          </a:xfrm>
+          <a:prstGeom prst="rightArrow">
+            <a:avLst/>
+          </a:prstGeom>
+        </p:spPr>
+        <p:style>
+          <a:lnRef idx="2">
+            <a:schemeClr val="accent1">
+              <a:shade val="50000"/>
+            </a:schemeClr>
+          </a:lnRef>
+          <a:fillRef idx="1">
+            <a:schemeClr val="accent1"/>
+          </a:fillRef>
+          <a:effectRef idx="0">
+            <a:schemeClr val="accent1"/>
+          </a:effectRef>
+          <a:fontRef idx="minor">
+            <a:schemeClr val="lt1"/>
+          </a:fontRef>
+        </p:style>
+        <p:txBody>
+          <a:bodyPr rtlCol="0" anchor="ctr"/>
+          <a:lstStyle/>
+          <a:p>
+            <a:pPr algn="ctr"/>
+            <a:endParaRPr lang="en-US"/>
+          </a:p>
+        </p:txBody>
+      </p:sp>
+      <p:sp>
+        <p:nvSpPr>
+          <p:cNvPr id="26" name="Rectangle 25"/>
+          <p:cNvSpPr/>
+          <p:nvPr/>
+        </p:nvSpPr>
+        <p:spPr>
+          <a:xfrm>
+            <a:off x="5336368" y="2068833"/>
+            <a:ext cx="2564614" cy="2234564"/>
           </a:xfrm>
           <a:prstGeom prst="rect">
             <a:avLst/>
           </a:prstGeom>
           <a:noFill/>
         </p:spPr>
-        <p:txBody>
-          <a:bodyPr wrap="square" rtlCol="0">
-            <a:spAutoFit/>
-          </a:bodyPr>
-          <a:lstStyle/>
-          <a:p>
-            <a:pPr algn="ctr"/>
-            <a:r>
-              <a:rPr lang="en-US" dirty="0" smtClean="0"/>
-              <a:t>Data Related</a:t>
-            </a:r>
-            <a:endParaRPr lang="en-US" dirty="0"/>
-          </a:p>
-        </p:txBody>
-      </p:sp>
-      <p:sp>
-        <p:nvSpPr>
-          <p:cNvPr id="10" name="TextBox 9"/>
-          <p:cNvSpPr txBox="1"/>
+        <p:style>
+          <a:lnRef idx="2">
+            <a:schemeClr val="accent1">
+              <a:shade val="50000"/>
+            </a:schemeClr>
+          </a:lnRef>
+          <a:fillRef idx="1">
+            <a:schemeClr val="accent1"/>
+          </a:fillRef>
+          <a:effectRef idx="0">
+            <a:schemeClr val="accent1"/>
+          </a:effectRef>
+          <a:fontRef idx="minor">
+            <a:schemeClr val="lt1"/>
+          </a:fontRef>
+        </p:style>
+        <p:txBody>
+          <a:bodyPr rtlCol="0" anchor="ctr"/>
+          <a:lstStyle/>
+          <a:p>
+            <a:pPr marL="285750" indent="-285750">
+              <a:buFont typeface="Arial" panose="020B0604020202020204" pitchFamily="34" charset="0"/>
+              <a:buChar char="•"/>
+            </a:pPr>
+            <a:r>
+              <a:rPr lang="en-US" dirty="0" smtClean="0">
+                <a:solidFill>
+                  <a:schemeClr val="tx1"/>
+                </a:solidFill>
+              </a:rPr>
+              <a:t>Forward propagation , error calculation. </a:t>
+            </a:r>
+          </a:p>
+          <a:p>
+            <a:pPr marL="285750" indent="-285750">
+              <a:buFont typeface="Arial" panose="020B0604020202020204" pitchFamily="34" charset="0"/>
+              <a:buChar char="•"/>
+            </a:pPr>
+            <a:r>
+              <a:rPr lang="en-US" dirty="0" smtClean="0">
+                <a:solidFill>
+                  <a:schemeClr val="tx1"/>
+                </a:solidFill>
+              </a:rPr>
+              <a:t>Back Propagation and next example. </a:t>
+            </a:r>
+          </a:p>
+          <a:p>
+            <a:pPr marL="285750" indent="-285750">
+              <a:buFont typeface="Arial" panose="020B0604020202020204" pitchFamily="34" charset="0"/>
+              <a:buChar char="•"/>
+            </a:pPr>
+            <a:r>
+              <a:rPr lang="en-US" dirty="0" smtClean="0">
+                <a:solidFill>
+                  <a:schemeClr val="tx1"/>
+                </a:solidFill>
+              </a:rPr>
+              <a:t>Continue and even recurs until error converge</a:t>
+            </a:r>
+          </a:p>
+        </p:txBody>
+      </p:sp>
+      <p:sp>
+        <p:nvSpPr>
+          <p:cNvPr id="27" name="Rectangle 26"/>
+          <p:cNvSpPr/>
           <p:nvPr/>
         </p:nvSpPr>
         <p:spPr>
           <a:xfrm>
-            <a:off x="142874" y="2862947"/>
-            <a:ext cx="1285875" cy="646331"/>
+            <a:off x="8173449" y="2020744"/>
+            <a:ext cx="2564614" cy="2234564"/>
           </a:xfrm>
           <a:prstGeom prst="rect">
             <a:avLst/>
           </a:prstGeom>
           <a:noFill/>
         </p:spPr>
-        <p:txBody>
-          <a:bodyPr wrap="square" rtlCol="0">
-            <a:spAutoFit/>
-          </a:bodyPr>
+        <p:style>
+          <a:lnRef idx="2">
+            <a:schemeClr val="accent1">
+              <a:shade val="50000"/>
+            </a:schemeClr>
+          </a:lnRef>
+          <a:fillRef idx="1">
+            <a:schemeClr val="accent1"/>
+          </a:fillRef>
+          <a:effectRef idx="0">
+            <a:schemeClr val="accent1"/>
+          </a:effectRef>
+          <a:fontRef idx="minor">
+            <a:schemeClr val="lt1"/>
+          </a:fontRef>
+        </p:style>
+        <p:txBody>
+          <a:bodyPr rtlCol="0" anchor="ctr"/>
+          <a:lstStyle/>
+          <a:p>
+            <a:pPr marL="285750" indent="-285750">
+              <a:buFont typeface="Arial" panose="020B0604020202020204" pitchFamily="34" charset="0"/>
+              <a:buChar char="•"/>
+            </a:pPr>
+            <a:r>
+              <a:rPr lang="en-US" dirty="0" smtClean="0">
+                <a:solidFill>
+                  <a:schemeClr val="tx1"/>
+                </a:solidFill>
+              </a:rPr>
+              <a:t>Select trained weights and test the algorithm and find the classifier accuracy</a:t>
+            </a:r>
+          </a:p>
+        </p:txBody>
+      </p:sp>
+      <p:sp>
+        <p:nvSpPr>
+          <p:cNvPr id="28" name="Right Arrow 27"/>
+          <p:cNvSpPr/>
+          <p:nvPr/>
+        </p:nvSpPr>
+        <p:spPr>
+          <a:xfrm>
+            <a:off x="7747896" y="3028951"/>
+            <a:ext cx="578639" cy="332453"/>
+          </a:xfrm>
+          <a:prstGeom prst="rightArrow">
+            <a:avLst/>
+          </a:prstGeom>
+        </p:spPr>
+        <p:style>
+          <a:lnRef idx="2">
+            <a:schemeClr val="accent1">
+              <a:shade val="50000"/>
+            </a:schemeClr>
+          </a:lnRef>
+          <a:fillRef idx="1">
+            <a:schemeClr val="accent1"/>
+          </a:fillRef>
+          <a:effectRef idx="0">
+            <a:schemeClr val="accent1"/>
+          </a:effectRef>
+          <a:fontRef idx="minor">
+            <a:schemeClr val="lt1"/>
+          </a:fontRef>
+        </p:style>
+        <p:txBody>
+          <a:bodyPr rtlCol="0" anchor="ctr"/>
           <a:lstStyle/>
           <a:p>
             <a:pPr algn="ctr"/>
-            <a:r>
-              <a:rPr lang="en-US" dirty="0" smtClean="0"/>
-              <a:t>Algorithm Based</a:t>
-            </a:r>
-            <a:endParaRPr lang="en-US" dirty="0"/>
-          </a:p>
-        </p:txBody>
-      </p:sp>
-      <p:sp>
-        <p:nvSpPr>
-          <p:cNvPr id="11" name="TextBox 10"/>
+            <a:endParaRPr lang="en-US"/>
+          </a:p>
+        </p:txBody>
+      </p:sp>
+      <p:sp>
+        <p:nvSpPr>
+          <p:cNvPr id="29" name="TextBox 28"/>
           <p:cNvSpPr txBox="1"/>
           <p:nvPr/>
         </p:nvSpPr>
         <p:spPr>
           <a:xfrm>
-            <a:off x="214312" y="5458509"/>
-            <a:ext cx="1285875" cy="369332"/>
+            <a:off x="10791804" y="2693203"/>
+            <a:ext cx="1311062" cy="923330"/>
           </a:xfrm>
           <a:prstGeom prst="rect">
             <a:avLst/>
@@ -3402,10 +4021,450 @@
           </a:bodyPr>
           <a:lstStyle/>
           <a:p>
+            <a:r>
+              <a:rPr lang="en-US" dirty="0" smtClean="0"/>
+              <a:t>Classifier accuracy</a:t>
+            </a:r>
+          </a:p>
+          <a:p>
+            <a:endParaRPr lang="en-US" dirty="0"/>
+          </a:p>
+        </p:txBody>
+      </p:sp>
+      <p:sp>
+        <p:nvSpPr>
+          <p:cNvPr id="30" name="TextBox 29"/>
+          <p:cNvSpPr txBox="1"/>
+          <p:nvPr/>
+        </p:nvSpPr>
+        <p:spPr>
+          <a:xfrm>
+            <a:off x="650692" y="4650586"/>
+            <a:ext cx="1311062" cy="1754326"/>
+          </a:xfrm>
+          <a:prstGeom prst="rect">
+            <a:avLst/>
+          </a:prstGeom>
+          <a:noFill/>
+        </p:spPr>
+        <p:txBody>
+          <a:bodyPr wrap="square" rtlCol="0">
+            <a:spAutoFit/>
+          </a:bodyPr>
+          <a:lstStyle/>
+          <a:p>
+            <a:r>
+              <a:rPr lang="en-US" dirty="0" err="1" smtClean="0"/>
+              <a:t>Slection</a:t>
+            </a:r>
+            <a:r>
+              <a:rPr lang="en-US" dirty="0" smtClean="0"/>
+              <a:t> of Graphs (Nodes) needed to be Displayed</a:t>
+            </a:r>
+          </a:p>
+        </p:txBody>
+      </p:sp>
+      <p:sp>
+        <p:nvSpPr>
+          <p:cNvPr id="31" name="Right Arrow 30"/>
+          <p:cNvSpPr/>
+          <p:nvPr/>
+        </p:nvSpPr>
+        <p:spPr>
+          <a:xfrm rot="5400000">
+            <a:off x="6163129" y="4429092"/>
+            <a:ext cx="578639" cy="332453"/>
+          </a:xfrm>
+          <a:prstGeom prst="rightArrow">
+            <a:avLst/>
+          </a:prstGeom>
+        </p:spPr>
+        <p:style>
+          <a:lnRef idx="2">
+            <a:schemeClr val="accent1">
+              <a:shade val="50000"/>
+            </a:schemeClr>
+          </a:lnRef>
+          <a:fillRef idx="1">
+            <a:schemeClr val="accent1"/>
+          </a:fillRef>
+          <a:effectRef idx="0">
+            <a:schemeClr val="accent1"/>
+          </a:effectRef>
+          <a:fontRef idx="minor">
+            <a:schemeClr val="lt1"/>
+          </a:fontRef>
+        </p:style>
+        <p:txBody>
+          <a:bodyPr rtlCol="0" anchor="ctr"/>
+          <a:lstStyle/>
+          <a:p>
             <a:pPr algn="ctr"/>
+            <a:endParaRPr lang="en-US"/>
+          </a:p>
+        </p:txBody>
+      </p:sp>
+      <p:sp>
+        <p:nvSpPr>
+          <p:cNvPr id="32" name="Right Arrow 31"/>
+          <p:cNvSpPr/>
+          <p:nvPr/>
+        </p:nvSpPr>
+        <p:spPr>
+          <a:xfrm rot="5400000">
+            <a:off x="9166436" y="4371331"/>
+            <a:ext cx="578639" cy="332453"/>
+          </a:xfrm>
+          <a:prstGeom prst="rightArrow">
+            <a:avLst/>
+          </a:prstGeom>
+        </p:spPr>
+        <p:style>
+          <a:lnRef idx="2">
+            <a:schemeClr val="accent1">
+              <a:shade val="50000"/>
+            </a:schemeClr>
+          </a:lnRef>
+          <a:fillRef idx="1">
+            <a:schemeClr val="accent1"/>
+          </a:fillRef>
+          <a:effectRef idx="0">
+            <a:schemeClr val="accent1"/>
+          </a:effectRef>
+          <a:fontRef idx="minor">
+            <a:schemeClr val="lt1"/>
+          </a:fontRef>
+        </p:style>
+        <p:txBody>
+          <a:bodyPr rtlCol="0" anchor="ctr"/>
+          <a:lstStyle/>
+          <a:p>
+            <a:pPr algn="ctr"/>
+            <a:endParaRPr lang="en-US"/>
+          </a:p>
+        </p:txBody>
+      </p:sp>
+      <p:sp>
+        <p:nvSpPr>
+          <p:cNvPr id="33" name="Rectangle 32"/>
+          <p:cNvSpPr/>
+          <p:nvPr/>
+        </p:nvSpPr>
+        <p:spPr>
+          <a:xfrm>
+            <a:off x="5044802" y="4884638"/>
+            <a:ext cx="2564614" cy="1789186"/>
+          </a:xfrm>
+          <a:prstGeom prst="rect">
+            <a:avLst/>
+          </a:prstGeom>
+          <a:noFill/>
+        </p:spPr>
+        <p:style>
+          <a:lnRef idx="2">
+            <a:schemeClr val="accent1">
+              <a:shade val="50000"/>
+            </a:schemeClr>
+          </a:lnRef>
+          <a:fillRef idx="1">
+            <a:schemeClr val="accent1"/>
+          </a:fillRef>
+          <a:effectRef idx="0">
+            <a:schemeClr val="accent1"/>
+          </a:effectRef>
+          <a:fontRef idx="minor">
+            <a:schemeClr val="lt1"/>
+          </a:fontRef>
+        </p:style>
+        <p:txBody>
+          <a:bodyPr rtlCol="0" anchor="ctr"/>
+          <a:lstStyle/>
+          <a:p>
+            <a:pPr marL="285750" indent="-285750">
+              <a:buFont typeface="Arial" panose="020B0604020202020204" pitchFamily="34" charset="0"/>
+              <a:buChar char="•"/>
+            </a:pPr>
+            <a:r>
+              <a:rPr lang="en-US" dirty="0" smtClean="0">
+                <a:solidFill>
+                  <a:schemeClr val="tx1"/>
+                </a:solidFill>
+              </a:rPr>
+              <a:t>Saving of Graph Parameters after each Example (like h data for </a:t>
+            </a:r>
+            <a:r>
+              <a:rPr lang="en-US" dirty="0">
+                <a:solidFill>
+                  <a:schemeClr val="tx1"/>
+                </a:solidFill>
+              </a:rPr>
+              <a:t>h</a:t>
+            </a:r>
+            <a:r>
+              <a:rPr lang="en-US" dirty="0" smtClean="0">
+                <a:solidFill>
+                  <a:schemeClr val="tx1"/>
+                </a:solidFill>
+              </a:rPr>
+              <a:t>istogram)..etc.,</a:t>
+            </a:r>
+          </a:p>
+        </p:txBody>
+      </p:sp>
+      <p:sp>
+        <p:nvSpPr>
+          <p:cNvPr id="34" name="Right Arrow 33"/>
+          <p:cNvSpPr/>
+          <p:nvPr/>
+        </p:nvSpPr>
+        <p:spPr>
+          <a:xfrm rot="10800000">
+            <a:off x="6529388" y="4557106"/>
+            <a:ext cx="3078035" cy="356107"/>
+          </a:xfrm>
+          <a:prstGeom prst="rightArrow">
+            <a:avLst/>
+          </a:prstGeom>
+        </p:spPr>
+        <p:style>
+          <a:lnRef idx="2">
+            <a:schemeClr val="accent1">
+              <a:shade val="50000"/>
+            </a:schemeClr>
+          </a:lnRef>
+          <a:fillRef idx="1">
+            <a:schemeClr val="accent1"/>
+          </a:fillRef>
+          <a:effectRef idx="0">
+            <a:schemeClr val="accent1"/>
+          </a:effectRef>
+          <a:fontRef idx="minor">
+            <a:schemeClr val="lt1"/>
+          </a:fontRef>
+        </p:style>
+        <p:txBody>
+          <a:bodyPr rtlCol="0" anchor="ctr"/>
+          <a:lstStyle/>
+          <a:p>
+            <a:pPr algn="ctr"/>
+            <a:endParaRPr lang="en-US"/>
+          </a:p>
+        </p:txBody>
+      </p:sp>
+      <p:sp>
+        <p:nvSpPr>
+          <p:cNvPr id="35" name="Rectangle 34"/>
+          <p:cNvSpPr/>
+          <p:nvPr/>
+        </p:nvSpPr>
+        <p:spPr>
+          <a:xfrm>
+            <a:off x="2043100" y="4645150"/>
+            <a:ext cx="2564614" cy="2024902"/>
+          </a:xfrm>
+          <a:prstGeom prst="rect">
+            <a:avLst/>
+          </a:prstGeom>
+          <a:noFill/>
+        </p:spPr>
+        <p:style>
+          <a:lnRef idx="2">
+            <a:schemeClr val="accent1">
+              <a:shade val="50000"/>
+            </a:schemeClr>
+          </a:lnRef>
+          <a:fillRef idx="1">
+            <a:schemeClr val="accent1"/>
+          </a:fillRef>
+          <a:effectRef idx="0">
+            <a:schemeClr val="accent1"/>
+          </a:effectRef>
+          <a:fontRef idx="minor">
+            <a:schemeClr val="lt1"/>
+          </a:fontRef>
+        </p:style>
+        <p:txBody>
+          <a:bodyPr rtlCol="0" anchor="ctr"/>
+          <a:lstStyle/>
+          <a:p>
+            <a:pPr marL="285750" indent="-285750">
+              <a:buFont typeface="Arial" panose="020B0604020202020204" pitchFamily="34" charset="0"/>
+              <a:buChar char="•"/>
+            </a:pPr>
+            <a:r>
+              <a:rPr lang="en-US" dirty="0" smtClean="0">
+                <a:solidFill>
+                  <a:schemeClr val="tx1"/>
+                </a:solidFill>
+              </a:rPr>
+              <a:t>Selection of Graph to be displayed training vs test error</a:t>
+            </a:r>
+          </a:p>
+          <a:p>
+            <a:pPr marL="285750" indent="-285750">
+              <a:buFont typeface="Arial" panose="020B0604020202020204" pitchFamily="34" charset="0"/>
+              <a:buChar char="•"/>
+            </a:pPr>
+            <a:r>
+              <a:rPr lang="en-US" dirty="0" smtClean="0">
+                <a:solidFill>
+                  <a:schemeClr val="tx1"/>
+                </a:solidFill>
+              </a:rPr>
+              <a:t>Activation of hidden unit</a:t>
+            </a:r>
+          </a:p>
+          <a:p>
+            <a:pPr marL="285750" indent="-285750">
+              <a:buFont typeface="Arial" panose="020B0604020202020204" pitchFamily="34" charset="0"/>
+              <a:buChar char="•"/>
+            </a:pPr>
+            <a:r>
+              <a:rPr lang="en-US" dirty="0" smtClean="0">
+                <a:solidFill>
+                  <a:schemeClr val="tx1"/>
+                </a:solidFill>
+              </a:rPr>
+              <a:t>Weight changes for hidden unit over time.</a:t>
+            </a:r>
+          </a:p>
+        </p:txBody>
+      </p:sp>
+      <p:sp>
+        <p:nvSpPr>
+          <p:cNvPr id="39" name="Right Arrow 38"/>
+          <p:cNvSpPr/>
+          <p:nvPr/>
+        </p:nvSpPr>
+        <p:spPr>
+          <a:xfrm>
+            <a:off x="4536939" y="5613004"/>
+            <a:ext cx="578639" cy="332453"/>
+          </a:xfrm>
+          <a:prstGeom prst="rightArrow">
+            <a:avLst/>
+          </a:prstGeom>
+        </p:spPr>
+        <p:style>
+          <a:lnRef idx="2">
+            <a:schemeClr val="accent1">
+              <a:shade val="50000"/>
+            </a:schemeClr>
+          </a:lnRef>
+          <a:fillRef idx="1">
+            <a:schemeClr val="accent1"/>
+          </a:fillRef>
+          <a:effectRef idx="0">
+            <a:schemeClr val="accent1"/>
+          </a:effectRef>
+          <a:fontRef idx="minor">
+            <a:schemeClr val="lt1"/>
+          </a:fontRef>
+        </p:style>
+        <p:txBody>
+          <a:bodyPr rtlCol="0" anchor="ctr"/>
+          <a:lstStyle/>
+          <a:p>
+            <a:pPr algn="ctr"/>
+            <a:endParaRPr lang="en-US"/>
+          </a:p>
+        </p:txBody>
+      </p:sp>
+      <p:sp>
+        <p:nvSpPr>
+          <p:cNvPr id="40" name="TextBox 39"/>
+          <p:cNvSpPr txBox="1"/>
+          <p:nvPr/>
+        </p:nvSpPr>
+        <p:spPr>
+          <a:xfrm>
+            <a:off x="10791804" y="4645150"/>
+            <a:ext cx="1311062" cy="923330"/>
+          </a:xfrm>
+          <a:prstGeom prst="rect">
+            <a:avLst/>
+          </a:prstGeom>
+          <a:noFill/>
+        </p:spPr>
+        <p:txBody>
+          <a:bodyPr wrap="square" rtlCol="0">
+            <a:spAutoFit/>
+          </a:bodyPr>
+          <a:lstStyle/>
+          <a:p>
             <a:r>
               <a:rPr lang="en-US" dirty="0" smtClean="0"/>
-              <a:t>Outputs</a:t>
+              <a:t>Histogram,</a:t>
+            </a:r>
+          </a:p>
+          <a:p>
+            <a:r>
+              <a:rPr lang="en-US" dirty="0" smtClean="0"/>
+              <a:t>Two Line plots</a:t>
+            </a:r>
+            <a:endParaRPr lang="en-US" dirty="0"/>
+          </a:p>
+        </p:txBody>
+      </p:sp>
+      <p:sp>
+        <p:nvSpPr>
+          <p:cNvPr id="41" name="TextBox 40"/>
+          <p:cNvSpPr txBox="1"/>
+          <p:nvPr/>
+        </p:nvSpPr>
+        <p:spPr>
+          <a:xfrm>
+            <a:off x="741855" y="108852"/>
+            <a:ext cx="1171589" cy="369332"/>
+          </a:xfrm>
+          <a:prstGeom prst="rect">
+            <a:avLst/>
+          </a:prstGeom>
+          <a:solidFill>
+            <a:srgbClr val="FFFF00"/>
+          </a:solidFill>
+        </p:spPr>
+        <p:txBody>
+          <a:bodyPr wrap="square" rtlCol="0">
+            <a:spAutoFit/>
+          </a:bodyPr>
+          <a:lstStyle/>
+          <a:p>
+            <a:r>
+              <a:rPr lang="en-US" dirty="0" smtClean="0"/>
+              <a:t>Inputs</a:t>
+            </a:r>
+            <a:endParaRPr lang="en-US" dirty="0"/>
+          </a:p>
+        </p:txBody>
+      </p:sp>
+      <p:sp>
+        <p:nvSpPr>
+          <p:cNvPr id="42" name="TextBox 41"/>
+          <p:cNvSpPr txBox="1"/>
+          <p:nvPr/>
+        </p:nvSpPr>
+        <p:spPr>
+          <a:xfrm>
+            <a:off x="10839441" y="164344"/>
+            <a:ext cx="1171589" cy="369332"/>
+          </a:xfrm>
+          <a:prstGeom prst="rect">
+            <a:avLst/>
+          </a:prstGeom>
+          <a:solidFill>
+            <a:srgbClr val="FFFF00"/>
+          </a:solidFill>
+        </p:spPr>
+        <p:txBody>
+          <a:bodyPr wrap="square" rtlCol="0">
+            <a:spAutoFit/>
+          </a:bodyPr>
+          <a:lstStyle/>
+          <a:p>
+            <a:r>
+              <a:rPr lang="en-US" dirty="0" smtClean="0"/>
+              <a:t>outputs</a:t>
             </a:r>
             <a:endParaRPr lang="en-US" dirty="0"/>
           </a:p>
@@ -3421,6 +4480,13 @@
   <p:clrMapOvr>
     <a:masterClrMapping/>
   </p:clrMapOvr>
+  <p:timing>
+    <p:tnLst>
+      <p:par>
+        <p:cTn id="1" dur="indefinite" restart="never" nodeType="tmRoot"/>
+      </p:par>
+    </p:tnLst>
+  </p:timing>
 </p:sld>
 </file>
 

</xml_diff>